<commit_message>
done with the login logout and register
</commit_message>
<xml_diff>
--- a/Presentation1.pptx
+++ b/Presentation1.pptx
@@ -6,8 +6,11 @@
   </p:sldMasterIdLst>
   <p:sldIdLst>
     <p:sldId id="256" r:id="rId2"/>
-    <p:sldId id="257" r:id="rId3"/>
-    <p:sldId id="258" r:id="rId4"/>
+    <p:sldId id="258" r:id="rId3"/>
+    <p:sldId id="259" r:id="rId4"/>
+    <p:sldId id="257" r:id="rId5"/>
+    <p:sldId id="260" r:id="rId6"/>
+    <p:sldId id="261" r:id="rId7"/>
   </p:sldIdLst>
   <p:sldSz cx="12192000" cy="6858000"/>
   <p:notesSz cx="6858000" cy="9144000"/>
@@ -263,7 +266,7 @@
           <a:p>
             <a:fld id="{5D308381-4A10-441C-8078-904C7932E27C}" type="datetimeFigureOut">
               <a:rPr lang="en-IN" smtClean="0"/>
-              <a:t>24-09-2022</a:t>
+              <a:t>21-11-2022</a:t>
             </a:fld>
             <a:endParaRPr lang="en-IN"/>
           </a:p>
@@ -463,7 +466,7 @@
           <a:p>
             <a:fld id="{5D308381-4A10-441C-8078-904C7932E27C}" type="datetimeFigureOut">
               <a:rPr lang="en-IN" smtClean="0"/>
-              <a:t>24-09-2022</a:t>
+              <a:t>21-11-2022</a:t>
             </a:fld>
             <a:endParaRPr lang="en-IN"/>
           </a:p>
@@ -673,7 +676,7 @@
           <a:p>
             <a:fld id="{5D308381-4A10-441C-8078-904C7932E27C}" type="datetimeFigureOut">
               <a:rPr lang="en-IN" smtClean="0"/>
-              <a:t>24-09-2022</a:t>
+              <a:t>21-11-2022</a:t>
             </a:fld>
             <a:endParaRPr lang="en-IN"/>
           </a:p>
@@ -873,7 +876,7 @@
           <a:p>
             <a:fld id="{5D308381-4A10-441C-8078-904C7932E27C}" type="datetimeFigureOut">
               <a:rPr lang="en-IN" smtClean="0"/>
-              <a:t>24-09-2022</a:t>
+              <a:t>21-11-2022</a:t>
             </a:fld>
             <a:endParaRPr lang="en-IN"/>
           </a:p>
@@ -1149,7 +1152,7 @@
           <a:p>
             <a:fld id="{5D308381-4A10-441C-8078-904C7932E27C}" type="datetimeFigureOut">
               <a:rPr lang="en-IN" smtClean="0"/>
-              <a:t>24-09-2022</a:t>
+              <a:t>21-11-2022</a:t>
             </a:fld>
             <a:endParaRPr lang="en-IN"/>
           </a:p>
@@ -1417,7 +1420,7 @@
           <a:p>
             <a:fld id="{5D308381-4A10-441C-8078-904C7932E27C}" type="datetimeFigureOut">
               <a:rPr lang="en-IN" smtClean="0"/>
-              <a:t>24-09-2022</a:t>
+              <a:t>21-11-2022</a:t>
             </a:fld>
             <a:endParaRPr lang="en-IN"/>
           </a:p>
@@ -1832,7 +1835,7 @@
           <a:p>
             <a:fld id="{5D308381-4A10-441C-8078-904C7932E27C}" type="datetimeFigureOut">
               <a:rPr lang="en-IN" smtClean="0"/>
-              <a:t>24-09-2022</a:t>
+              <a:t>21-11-2022</a:t>
             </a:fld>
             <a:endParaRPr lang="en-IN"/>
           </a:p>
@@ -1974,7 +1977,7 @@
           <a:p>
             <a:fld id="{5D308381-4A10-441C-8078-904C7932E27C}" type="datetimeFigureOut">
               <a:rPr lang="en-IN" smtClean="0"/>
-              <a:t>24-09-2022</a:t>
+              <a:t>21-11-2022</a:t>
             </a:fld>
             <a:endParaRPr lang="en-IN"/>
           </a:p>
@@ -2087,7 +2090,7 @@
           <a:p>
             <a:fld id="{5D308381-4A10-441C-8078-904C7932E27C}" type="datetimeFigureOut">
               <a:rPr lang="en-IN" smtClean="0"/>
-              <a:t>24-09-2022</a:t>
+              <a:t>21-11-2022</a:t>
             </a:fld>
             <a:endParaRPr lang="en-IN"/>
           </a:p>
@@ -2400,7 +2403,7 @@
           <a:p>
             <a:fld id="{5D308381-4A10-441C-8078-904C7932E27C}" type="datetimeFigureOut">
               <a:rPr lang="en-IN" smtClean="0"/>
-              <a:t>24-09-2022</a:t>
+              <a:t>21-11-2022</a:t>
             </a:fld>
             <a:endParaRPr lang="en-IN"/>
           </a:p>
@@ -2689,7 +2692,7 @@
           <a:p>
             <a:fld id="{5D308381-4A10-441C-8078-904C7932E27C}" type="datetimeFigureOut">
               <a:rPr lang="en-IN" smtClean="0"/>
-              <a:t>24-09-2022</a:t>
+              <a:t>21-11-2022</a:t>
             </a:fld>
             <a:endParaRPr lang="en-IN"/>
           </a:p>
@@ -2932,7 +2935,7 @@
           <a:p>
             <a:fld id="{5D308381-4A10-441C-8078-904C7932E27C}" type="datetimeFigureOut">
               <a:rPr lang="en-IN" smtClean="0"/>
-              <a:t>24-09-2022</a:t>
+              <a:t>21-11-2022</a:t>
             </a:fld>
             <a:endParaRPr lang="en-IN"/>
           </a:p>
@@ -3762,10 +3765,10 @@
       </p:grpSpPr>
       <p:pic>
         <p:nvPicPr>
-          <p:cNvPr id="1026" name="Picture 2">
-            <a:extLst>
-              <a:ext uri="{FF2B5EF4-FFF2-40B4-BE49-F238E27FC236}">
-                <a16:creationId xmlns:a16="http://schemas.microsoft.com/office/drawing/2014/main" id="{3DDA38E2-E9DF-54D4-6BEE-A81D0BA37261}"/>
+          <p:cNvPr id="4" name="Picture 2">
+            <a:extLst>
+              <a:ext uri="{FF2B5EF4-FFF2-40B4-BE49-F238E27FC236}">
+                <a16:creationId xmlns:a16="http://schemas.microsoft.com/office/drawing/2014/main" id="{844C722E-F73E-F3FE-A117-39B3525EFB8F}"/>
               </a:ext>
             </a:extLst>
           </p:cNvPr>
@@ -3811,24 +3814,213 @@
       </p:pic>
       <p:sp>
         <p:nvSpPr>
-          <p:cNvPr id="4" name="Rectangle 3">
-            <a:extLst>
-              <a:ext uri="{FF2B5EF4-FFF2-40B4-BE49-F238E27FC236}">
-                <a16:creationId xmlns:a16="http://schemas.microsoft.com/office/drawing/2014/main" id="{A6CACB2C-7510-36A4-7C32-864EFE999B9A}"/>
-              </a:ext>
-            </a:extLst>
-          </p:cNvPr>
-          <p:cNvSpPr/>
+          <p:cNvPr id="2" name="TextBox 1">
+            <a:extLst>
+              <a:ext uri="{FF2B5EF4-FFF2-40B4-BE49-F238E27FC236}">
+                <a16:creationId xmlns:a16="http://schemas.microsoft.com/office/drawing/2014/main" id="{B5CDD24A-9F89-74E4-BAE6-1EBE823AC4CC}"/>
+              </a:ext>
+            </a:extLst>
+          </p:cNvPr>
+          <p:cNvSpPr txBox="1"/>
           <p:nvPr/>
         </p:nvSpPr>
         <p:spPr>
           <a:xfrm>
-            <a:off x="2430011" y="2434689"/>
-            <a:ext cx="7331978" cy="394282"/>
+            <a:off x="5399713" y="771785"/>
+            <a:ext cx="1199626" cy="461665"/>
           </a:xfrm>
           <a:prstGeom prst="rect">
             <a:avLst/>
           </a:prstGeom>
+          <a:noFill/>
+        </p:spPr>
+        <p:txBody>
+          <a:bodyPr wrap="square" rtlCol="0">
+            <a:spAutoFit/>
+          </a:bodyPr>
+          <a:lstStyle/>
+          <a:p>
+            <a:pPr algn="ctr"/>
+            <a:r>
+              <a:rPr lang="en-IN" sz="2400" dirty="0">
+                <a:ln>
+                  <a:solidFill>
+                    <a:schemeClr val="bg1"/>
+                  </a:solidFill>
+                </a:ln>
+                <a:solidFill>
+                  <a:schemeClr val="bg1"/>
+                </a:solidFill>
+                <a:latin typeface="Bradley Hand ITC" panose="03070402050302030203" pitchFamily="66" charset="0"/>
+              </a:rPr>
+              <a:t>LOGIN</a:t>
+            </a:r>
+          </a:p>
+        </p:txBody>
+      </p:sp>
+      <p:sp>
+        <p:nvSpPr>
+          <p:cNvPr id="3" name="Rectangle 2">
+            <a:extLst>
+              <a:ext uri="{FF2B5EF4-FFF2-40B4-BE49-F238E27FC236}">
+                <a16:creationId xmlns:a16="http://schemas.microsoft.com/office/drawing/2014/main" id="{8EBACA49-F2CB-6A71-0FBC-1A14DAD10273}"/>
+              </a:ext>
+            </a:extLst>
+          </p:cNvPr>
+          <p:cNvSpPr/>
+          <p:nvPr/>
+        </p:nvSpPr>
+        <p:spPr>
+          <a:xfrm>
+            <a:off x="4420998" y="1577130"/>
+            <a:ext cx="3187817" cy="268448"/>
+          </a:xfrm>
+          <a:prstGeom prst="rect">
+            <a:avLst/>
+          </a:prstGeom>
+          <a:solidFill>
+            <a:schemeClr val="bg1"/>
+          </a:solidFill>
+          <a:ln>
+            <a:solidFill>
+              <a:schemeClr val="bg1"/>
+            </a:solidFill>
+          </a:ln>
+        </p:spPr>
+        <p:style>
+          <a:lnRef idx="2">
+            <a:schemeClr val="accent1">
+              <a:shade val="50000"/>
+            </a:schemeClr>
+          </a:lnRef>
+          <a:fillRef idx="1">
+            <a:schemeClr val="accent1"/>
+          </a:fillRef>
+          <a:effectRef idx="0">
+            <a:schemeClr val="accent1"/>
+          </a:effectRef>
+          <a:fontRef idx="minor">
+            <a:schemeClr val="lt1"/>
+          </a:fontRef>
+        </p:style>
+        <p:txBody>
+          <a:bodyPr rtlCol="0" anchor="ctr"/>
+          <a:lstStyle/>
+          <a:p>
+            <a:pPr algn="ctr"/>
+            <a:r>
+              <a:rPr lang="en-IN" dirty="0">
+                <a:ln>
+                  <a:solidFill>
+                    <a:schemeClr val="bg1">
+                      <a:lumMod val="65000"/>
+                    </a:schemeClr>
+                  </a:solidFill>
+                </a:ln>
+                <a:solidFill>
+                  <a:schemeClr val="bg1">
+                    <a:lumMod val="65000"/>
+                  </a:schemeClr>
+                </a:solidFill>
+                <a:latin typeface="Bradley Hand ITC" panose="03070402050302030203" pitchFamily="66" charset="0"/>
+              </a:rPr>
+              <a:t>username</a:t>
+            </a:r>
+          </a:p>
+        </p:txBody>
+      </p:sp>
+      <p:sp>
+        <p:nvSpPr>
+          <p:cNvPr id="5" name="Rectangle 4">
+            <a:extLst>
+              <a:ext uri="{FF2B5EF4-FFF2-40B4-BE49-F238E27FC236}">
+                <a16:creationId xmlns:a16="http://schemas.microsoft.com/office/drawing/2014/main" id="{7BC130F5-513D-52BE-3762-02DA9F1EB01F}"/>
+              </a:ext>
+            </a:extLst>
+          </p:cNvPr>
+          <p:cNvSpPr/>
+          <p:nvPr/>
+        </p:nvSpPr>
+        <p:spPr>
+          <a:xfrm>
+            <a:off x="4429387" y="2150378"/>
+            <a:ext cx="3187817" cy="268448"/>
+          </a:xfrm>
+          <a:prstGeom prst="rect">
+            <a:avLst/>
+          </a:prstGeom>
+          <a:solidFill>
+            <a:schemeClr val="bg1"/>
+          </a:solidFill>
+          <a:ln>
+            <a:solidFill>
+              <a:schemeClr val="bg1"/>
+            </a:solidFill>
+          </a:ln>
+        </p:spPr>
+        <p:style>
+          <a:lnRef idx="2">
+            <a:schemeClr val="accent1">
+              <a:shade val="50000"/>
+            </a:schemeClr>
+          </a:lnRef>
+          <a:fillRef idx="1">
+            <a:schemeClr val="accent1"/>
+          </a:fillRef>
+          <a:effectRef idx="0">
+            <a:schemeClr val="accent1"/>
+          </a:effectRef>
+          <a:fontRef idx="minor">
+            <a:schemeClr val="lt1"/>
+          </a:fontRef>
+        </p:style>
+        <p:txBody>
+          <a:bodyPr rtlCol="0" anchor="ctr"/>
+          <a:lstStyle/>
+          <a:p>
+            <a:pPr algn="ctr"/>
+            <a:r>
+              <a:rPr lang="en-IN" dirty="0">
+                <a:ln>
+                  <a:solidFill>
+                    <a:schemeClr val="bg1">
+                      <a:lumMod val="65000"/>
+                    </a:schemeClr>
+                  </a:solidFill>
+                </a:ln>
+                <a:solidFill>
+                  <a:schemeClr val="bg1">
+                    <a:lumMod val="65000"/>
+                  </a:schemeClr>
+                </a:solidFill>
+                <a:latin typeface="Bradley Hand ITC" panose="03070402050302030203" pitchFamily="66" charset="0"/>
+              </a:rPr>
+              <a:t>password</a:t>
+            </a:r>
+          </a:p>
+        </p:txBody>
+      </p:sp>
+      <p:sp>
+        <p:nvSpPr>
+          <p:cNvPr id="6" name="Rectangle 5">
+            <a:extLst>
+              <a:ext uri="{FF2B5EF4-FFF2-40B4-BE49-F238E27FC236}">
+                <a16:creationId xmlns:a16="http://schemas.microsoft.com/office/drawing/2014/main" id="{0B070963-D31E-BB2F-7192-D45886C69F08}"/>
+              </a:ext>
+            </a:extLst>
+          </p:cNvPr>
+          <p:cNvSpPr/>
+          <p:nvPr/>
+        </p:nvSpPr>
+        <p:spPr>
+          <a:xfrm>
+            <a:off x="989900" y="3328601"/>
+            <a:ext cx="10050011" cy="411060"/>
+          </a:xfrm>
+          <a:prstGeom prst="rect">
+            <a:avLst/>
+          </a:prstGeom>
+          <a:noFill/>
           <a:ln>
             <a:noFill/>
           </a:ln>
@@ -3853,25 +4045,42 @@
           <a:p>
             <a:pPr algn="ctr"/>
             <a:r>
-              <a:rPr lang="en-US" b="1" dirty="0">
+              <a:rPr lang="en-IN" dirty="0">
+                <a:ln>
+                  <a:solidFill>
+                    <a:schemeClr val="bg1"/>
+                  </a:solidFill>
+                </a:ln>
+                <a:solidFill>
+                  <a:schemeClr val="bg1"/>
+                </a:solidFill>
                 <a:latin typeface="Bradley Hand ITC" panose="03070402050302030203" pitchFamily="66" charset="0"/>
-                <a:cs typeface="Times New Roman" panose="02020603050405020304" pitchFamily="18" charset="0"/>
               </a:rPr>
-              <a:t>UPLOAD</a:t>
-            </a:r>
-            <a:endParaRPr lang="en-IN" b="1" dirty="0">
-              <a:latin typeface="Bradley Hand ITC" panose="03070402050302030203" pitchFamily="66" charset="0"/>
-              <a:cs typeface="Times New Roman" panose="02020603050405020304" pitchFamily="18" charset="0"/>
-            </a:endParaRPr>
-          </a:p>
-        </p:txBody>
-      </p:sp>
-      <p:sp>
-        <p:nvSpPr>
-          <p:cNvPr id="5" name="Rectangle 4">
-            <a:extLst>
-              <a:ext uri="{FF2B5EF4-FFF2-40B4-BE49-F238E27FC236}">
-                <a16:creationId xmlns:a16="http://schemas.microsoft.com/office/drawing/2014/main" id="{DF39FEAC-3F1A-1470-8E5D-E657E4F90469}"/>
+              <a:t>Need an account? </a:t>
+            </a:r>
+            <a:r>
+              <a:rPr lang="en-IN" u="sng" dirty="0">
+                <a:ln>
+                  <a:solidFill>
+                    <a:srgbClr val="0070C0"/>
+                  </a:solidFill>
+                </a:ln>
+                <a:solidFill>
+                  <a:srgbClr val="0070C0"/>
+                </a:solidFill>
+                <a:latin typeface="Bradley Hand ITC" panose="03070402050302030203" pitchFamily="66" charset="0"/>
+              </a:rPr>
+              <a:t>Register</a:t>
+            </a:r>
+          </a:p>
+        </p:txBody>
+      </p:sp>
+      <p:sp>
+        <p:nvSpPr>
+          <p:cNvPr id="7" name="Rectangle 6">
+            <a:extLst>
+              <a:ext uri="{FF2B5EF4-FFF2-40B4-BE49-F238E27FC236}">
+                <a16:creationId xmlns:a16="http://schemas.microsoft.com/office/drawing/2014/main" id="{71DAD2E7-DDC9-1BA0-2965-27F13855290C}"/>
               </a:ext>
             </a:extLst>
           </p:cNvPr>
@@ -3880,25 +4089,23 @@
         </p:nvSpPr>
         <p:spPr>
           <a:xfrm>
-            <a:off x="2430011" y="3103186"/>
-            <a:ext cx="7331978" cy="394282"/>
+            <a:off x="5519956" y="2625754"/>
+            <a:ext cx="1006679" cy="268448"/>
           </a:xfrm>
           <a:prstGeom prst="rect">
             <a:avLst/>
           </a:prstGeom>
-          <a:ln>
-            <a:noFill/>
-          </a:ln>
+          <a:ln/>
         </p:spPr>
         <p:style>
-          <a:lnRef idx="2">
-            <a:schemeClr val="dk1"/>
+          <a:lnRef idx="1">
+            <a:schemeClr val="accent3"/>
           </a:lnRef>
-          <a:fillRef idx="1">
-            <a:schemeClr val="lt1"/>
+          <a:fillRef idx="2">
+            <a:schemeClr val="accent3"/>
           </a:fillRef>
-          <a:effectRef idx="0">
-            <a:schemeClr val="dk1"/>
+          <a:effectRef idx="1">
+            <a:schemeClr val="accent3"/>
           </a:effectRef>
           <a:fontRef idx="minor">
             <a:schemeClr val="dk1"/>
@@ -3910,255 +4117,19 @@
           <a:p>
             <a:pPr algn="ctr"/>
             <a:r>
-              <a:rPr lang="en-US" b="1" dirty="0">
-                <a:latin typeface="Bradley Hand ITC" panose="03070402050302030203" pitchFamily="66" charset="0"/>
+              <a:rPr lang="en-IN" sz="1400" dirty="0">
+                <a:ln>
+                  <a:solidFill>
+                    <a:schemeClr val="tx1"/>
+                  </a:solidFill>
+                </a:ln>
+                <a:solidFill>
+                  <a:schemeClr val="tx1"/>
+                </a:solidFill>
+                <a:latin typeface="Times New Roman" panose="02020603050405020304" pitchFamily="18" charset="0"/>
                 <a:cs typeface="Times New Roman" panose="02020603050405020304" pitchFamily="18" charset="0"/>
               </a:rPr>
-              <a:t>WARDROBE</a:t>
-            </a:r>
-            <a:endParaRPr lang="en-IN" b="1" dirty="0">
-              <a:latin typeface="Bradley Hand ITC" panose="03070402050302030203" pitchFamily="66" charset="0"/>
-              <a:cs typeface="Times New Roman" panose="02020603050405020304" pitchFamily="18" charset="0"/>
-            </a:endParaRPr>
-          </a:p>
-        </p:txBody>
-      </p:sp>
-      <p:sp>
-        <p:nvSpPr>
-          <p:cNvPr id="6" name="Rectangle 5">
-            <a:extLst>
-              <a:ext uri="{FF2B5EF4-FFF2-40B4-BE49-F238E27FC236}">
-                <a16:creationId xmlns:a16="http://schemas.microsoft.com/office/drawing/2014/main" id="{EF240956-B56F-0223-E4FF-2D95AA37E15F}"/>
-              </a:ext>
-            </a:extLst>
-          </p:cNvPr>
-          <p:cNvSpPr/>
-          <p:nvPr/>
-        </p:nvSpPr>
-        <p:spPr>
-          <a:xfrm>
-            <a:off x="2430011" y="3752634"/>
-            <a:ext cx="7331978" cy="394282"/>
-          </a:xfrm>
-          <a:prstGeom prst="rect">
-            <a:avLst/>
-          </a:prstGeom>
-          <a:ln>
-            <a:noFill/>
-          </a:ln>
-        </p:spPr>
-        <p:style>
-          <a:lnRef idx="2">
-            <a:schemeClr val="dk1"/>
-          </a:lnRef>
-          <a:fillRef idx="1">
-            <a:schemeClr val="lt1"/>
-          </a:fillRef>
-          <a:effectRef idx="0">
-            <a:schemeClr val="dk1"/>
-          </a:effectRef>
-          <a:fontRef idx="minor">
-            <a:schemeClr val="dk1"/>
-          </a:fontRef>
-        </p:style>
-        <p:txBody>
-          <a:bodyPr rtlCol="0" anchor="ctr"/>
-          <a:lstStyle/>
-          <a:p>
-            <a:pPr algn="ctr"/>
-            <a:r>
-              <a:rPr lang="en-US" b="1" dirty="0">
-                <a:latin typeface="Bradley Hand ITC" panose="03070402050302030203" pitchFamily="66" charset="0"/>
-                <a:cs typeface="Times New Roman" panose="02020603050405020304" pitchFamily="18" charset="0"/>
-              </a:rPr>
-              <a:t>PROFILE</a:t>
-            </a:r>
-            <a:endParaRPr lang="en-IN" b="1" dirty="0">
-              <a:latin typeface="Bradley Hand ITC" panose="03070402050302030203" pitchFamily="66" charset="0"/>
-              <a:cs typeface="Times New Roman" panose="02020603050405020304" pitchFamily="18" charset="0"/>
-            </a:endParaRPr>
-          </a:p>
-        </p:txBody>
-      </p:sp>
-      <p:sp>
-        <p:nvSpPr>
-          <p:cNvPr id="7" name="Rectangle 6">
-            <a:extLst>
-              <a:ext uri="{FF2B5EF4-FFF2-40B4-BE49-F238E27FC236}">
-                <a16:creationId xmlns:a16="http://schemas.microsoft.com/office/drawing/2014/main" id="{F5B470BF-F6F6-9E91-AC1A-A9B3621E314A}"/>
-              </a:ext>
-            </a:extLst>
-          </p:cNvPr>
-          <p:cNvSpPr/>
-          <p:nvPr/>
-        </p:nvSpPr>
-        <p:spPr>
-          <a:xfrm>
-            <a:off x="2430011" y="4430473"/>
-            <a:ext cx="7331978" cy="394282"/>
-          </a:xfrm>
-          <a:prstGeom prst="rect">
-            <a:avLst/>
-          </a:prstGeom>
-          <a:ln>
-            <a:noFill/>
-          </a:ln>
-        </p:spPr>
-        <p:style>
-          <a:lnRef idx="2">
-            <a:schemeClr val="dk1"/>
-          </a:lnRef>
-          <a:fillRef idx="1">
-            <a:schemeClr val="lt1"/>
-          </a:fillRef>
-          <a:effectRef idx="0">
-            <a:schemeClr val="dk1"/>
-          </a:effectRef>
-          <a:fontRef idx="minor">
-            <a:schemeClr val="dk1"/>
-          </a:fontRef>
-        </p:style>
-        <p:txBody>
-          <a:bodyPr rtlCol="0" anchor="ctr"/>
-          <a:lstStyle/>
-          <a:p>
-            <a:pPr algn="ctr"/>
-            <a:r>
-              <a:rPr lang="en-US" b="1" dirty="0">
-                <a:latin typeface="Bradley Hand ITC" panose="03070402050302030203" pitchFamily="66" charset="0"/>
-                <a:cs typeface="Times New Roman" panose="02020603050405020304" pitchFamily="18" charset="0"/>
-              </a:rPr>
-              <a:t>SETTINGS</a:t>
-            </a:r>
-            <a:endParaRPr lang="en-IN" b="1" dirty="0">
-              <a:latin typeface="Bradley Hand ITC" panose="03070402050302030203" pitchFamily="66" charset="0"/>
-              <a:cs typeface="Times New Roman" panose="02020603050405020304" pitchFamily="18" charset="0"/>
-            </a:endParaRPr>
-          </a:p>
-        </p:txBody>
-      </p:sp>
-      <p:sp>
-        <p:nvSpPr>
-          <p:cNvPr id="8" name="TextBox 7">
-            <a:extLst>
-              <a:ext uri="{FF2B5EF4-FFF2-40B4-BE49-F238E27FC236}">
-                <a16:creationId xmlns:a16="http://schemas.microsoft.com/office/drawing/2014/main" id="{4EB66EE0-EC20-D92A-856F-A9F63E085CA3}"/>
-              </a:ext>
-            </a:extLst>
-          </p:cNvPr>
-          <p:cNvSpPr txBox="1"/>
-          <p:nvPr/>
-        </p:nvSpPr>
-        <p:spPr>
-          <a:xfrm>
-            <a:off x="894825" y="5375221"/>
-            <a:ext cx="1535186" cy="1200329"/>
-          </a:xfrm>
-          <a:prstGeom prst="rect">
-            <a:avLst/>
-          </a:prstGeom>
-          <a:noFill/>
-        </p:spPr>
-        <p:txBody>
-          <a:bodyPr wrap="square" rtlCol="0">
-            <a:spAutoFit/>
-          </a:bodyPr>
-          <a:lstStyle/>
-          <a:p>
-            <a:r>
-              <a:rPr lang="en-US" b="1" dirty="0">
-                <a:solidFill>
-                  <a:schemeClr val="bg1"/>
-                </a:solidFill>
-                <a:latin typeface="Bradley Hand ITC" panose="03070402050302030203" pitchFamily="66" charset="0"/>
-              </a:rPr>
-              <a:t>#Twitter</a:t>
-            </a:r>
-          </a:p>
-          <a:p>
-            <a:r>
-              <a:rPr lang="en-US" b="1" dirty="0">
-                <a:solidFill>
-                  <a:schemeClr val="bg1"/>
-                </a:solidFill>
-                <a:latin typeface="Bradley Hand ITC" panose="03070402050302030203" pitchFamily="66" charset="0"/>
-              </a:rPr>
-              <a:t>#Instagram </a:t>
-            </a:r>
-          </a:p>
-          <a:p>
-            <a:r>
-              <a:rPr lang="en-US" b="1" dirty="0">
-                <a:solidFill>
-                  <a:schemeClr val="bg1"/>
-                </a:solidFill>
-                <a:latin typeface="Bradley Hand ITC" panose="03070402050302030203" pitchFamily="66" charset="0"/>
-              </a:rPr>
-              <a:t>#Snapchat</a:t>
-            </a:r>
-          </a:p>
-          <a:p>
-            <a:r>
-              <a:rPr lang="en-US" b="1" dirty="0">
-                <a:solidFill>
-                  <a:schemeClr val="bg1"/>
-                </a:solidFill>
-                <a:latin typeface="Bradley Hand ITC" panose="03070402050302030203" pitchFamily="66" charset="0"/>
-              </a:rPr>
-              <a:t>#mail-ID</a:t>
-            </a:r>
-          </a:p>
-        </p:txBody>
-      </p:sp>
-      <p:sp>
-        <p:nvSpPr>
-          <p:cNvPr id="9" name="Rectangle 8">
-            <a:extLst>
-              <a:ext uri="{FF2B5EF4-FFF2-40B4-BE49-F238E27FC236}">
-                <a16:creationId xmlns:a16="http://schemas.microsoft.com/office/drawing/2014/main" id="{816A194B-AFFA-2CDC-EF4A-46DBE9AA59E6}"/>
-              </a:ext>
-            </a:extLst>
-          </p:cNvPr>
-          <p:cNvSpPr/>
-          <p:nvPr/>
-        </p:nvSpPr>
-        <p:spPr>
-          <a:xfrm>
-            <a:off x="2430011" y="1761629"/>
-            <a:ext cx="7331978" cy="394282"/>
-          </a:xfrm>
-          <a:prstGeom prst="rect">
-            <a:avLst/>
-          </a:prstGeom>
-          <a:ln>
-            <a:noFill/>
-          </a:ln>
-        </p:spPr>
-        <p:style>
-          <a:lnRef idx="2">
-            <a:schemeClr val="dk1"/>
-          </a:lnRef>
-          <a:fillRef idx="1">
-            <a:schemeClr val="lt1"/>
-          </a:fillRef>
-          <a:effectRef idx="0">
-            <a:schemeClr val="dk1"/>
-          </a:effectRef>
-          <a:fontRef idx="minor">
-            <a:schemeClr val="dk1"/>
-          </a:fontRef>
-        </p:style>
-        <p:txBody>
-          <a:bodyPr rtlCol="0" anchor="ctr"/>
-          <a:lstStyle/>
-          <a:p>
-            <a:pPr algn="ctr"/>
-            <a:r>
-              <a:rPr lang="en-US" b="1" dirty="0">
-                <a:latin typeface="Bradley Hand ITC" panose="03070402050302030203" pitchFamily="66" charset="0"/>
-                <a:cs typeface="Times New Roman" panose="02020603050405020304" pitchFamily="18" charset="0"/>
-              </a:rPr>
-              <a:t>LATEST TRENDS</a:t>
+              <a:t>Login</a:t>
             </a:r>
           </a:p>
         </p:txBody>
@@ -4166,7 +4137,7 @@
     </p:spTree>
     <p:extLst>
       <p:ext uri="{BB962C8B-B14F-4D97-AF65-F5344CB8AC3E}">
-        <p14:creationId xmlns:p14="http://schemas.microsoft.com/office/powerpoint/2010/main" val="132505625"/>
+        <p14:creationId xmlns:p14="http://schemas.microsoft.com/office/powerpoint/2010/main" val="1352817263"/>
       </p:ext>
     </p:extLst>
   </p:cSld>
@@ -4195,19 +4166,17 @@
       </p:grpSpPr>
       <p:pic>
         <p:nvPicPr>
-          <p:cNvPr id="4" name="Picture 2">
-            <a:extLst>
-              <a:ext uri="{FF2B5EF4-FFF2-40B4-BE49-F238E27FC236}">
-                <a16:creationId xmlns:a16="http://schemas.microsoft.com/office/drawing/2014/main" id="{844C722E-F73E-F3FE-A117-39B3525EFB8F}"/>
+          <p:cNvPr id="5" name="Picture 2">
+            <a:extLst>
+              <a:ext uri="{FF2B5EF4-FFF2-40B4-BE49-F238E27FC236}">
+                <a16:creationId xmlns:a16="http://schemas.microsoft.com/office/drawing/2014/main" id="{E4B7220D-D469-2069-28F1-FDC09966D725}"/>
               </a:ext>
             </a:extLst>
           </p:cNvPr>
           <p:cNvPicPr>
-            <a:picLocks noGrp="1" noChangeAspect="1" noChangeArrowheads="1"/>
+            <a:picLocks noChangeAspect="1" noChangeArrowheads="1"/>
           </p:cNvPicPr>
-          <p:nvPr>
-            <p:ph idx="1"/>
-          </p:nvPr>
+          <p:nvPr/>
         </p:nvPicPr>
         <p:blipFill>
           <a:blip r:embed="rId2">
@@ -4224,7 +4193,7 @@
         </p:blipFill>
         <p:spPr bwMode="auto">
           <a:xfrm>
-            <a:off x="0" y="-1"/>
+            <a:off x="0" y="447"/>
             <a:ext cx="12192000" cy="6857553"/>
           </a:xfrm>
           <a:prstGeom prst="rect">
@@ -4242,10 +4211,1269 @@
           </a:extLst>
         </p:spPr>
       </p:pic>
+      <p:sp>
+        <p:nvSpPr>
+          <p:cNvPr id="2" name="Title 1">
+            <a:extLst>
+              <a:ext uri="{FF2B5EF4-FFF2-40B4-BE49-F238E27FC236}">
+                <a16:creationId xmlns:a16="http://schemas.microsoft.com/office/drawing/2014/main" id="{779107B6-4F93-936D-9C89-5727DFBFDB5D}"/>
+              </a:ext>
+            </a:extLst>
+          </p:cNvPr>
+          <p:cNvSpPr>
+            <a:spLocks noGrp="1"/>
+          </p:cNvSpPr>
+          <p:nvPr>
+            <p:ph type="title"/>
+          </p:nvPr>
+        </p:nvSpPr>
+        <p:spPr/>
+        <p:txBody>
+          <a:bodyPr>
+            <a:normAutofit/>
+          </a:bodyPr>
+          <a:lstStyle/>
+          <a:p>
+            <a:pPr algn="ctr"/>
+            <a:r>
+              <a:rPr lang="en-IN" sz="2400" dirty="0">
+                <a:ln>
+                  <a:solidFill>
+                    <a:schemeClr val="bg1"/>
+                  </a:solidFill>
+                </a:ln>
+                <a:solidFill>
+                  <a:schemeClr val="bg1"/>
+                </a:solidFill>
+                <a:latin typeface="Bradley Hand ITC" panose="03070402050302030203" pitchFamily="66" charset="0"/>
+              </a:rPr>
+              <a:t>Register</a:t>
+            </a:r>
+            <a:endParaRPr lang="en-IN" sz="2400" dirty="0"/>
+          </a:p>
+        </p:txBody>
+      </p:sp>
+      <p:sp>
+        <p:nvSpPr>
+          <p:cNvPr id="3" name="Content Placeholder 2">
+            <a:extLst>
+              <a:ext uri="{FF2B5EF4-FFF2-40B4-BE49-F238E27FC236}">
+                <a16:creationId xmlns:a16="http://schemas.microsoft.com/office/drawing/2014/main" id="{F22E8F86-593D-D617-E333-69CFB91B1E04}"/>
+              </a:ext>
+            </a:extLst>
+          </p:cNvPr>
+          <p:cNvSpPr>
+            <a:spLocks noGrp="1"/>
+          </p:cNvSpPr>
+          <p:nvPr>
+            <p:ph idx="1"/>
+          </p:nvPr>
+        </p:nvSpPr>
+        <p:spPr>
+          <a:xfrm>
+            <a:off x="2734812" y="2652259"/>
+            <a:ext cx="7256477" cy="3461092"/>
+          </a:xfrm>
+        </p:spPr>
+        <p:txBody>
+          <a:bodyPr>
+            <a:normAutofit/>
+          </a:bodyPr>
+          <a:lstStyle/>
+          <a:p>
+            <a:pPr>
+              <a:buFont typeface="Arial" panose="020B0604020202020204" pitchFamily="34" charset="0"/>
+              <a:buChar char="•"/>
+            </a:pPr>
+            <a:r>
+              <a:rPr lang="en-US" sz="1800" b="1" i="0" dirty="0">
+                <a:solidFill>
+                  <a:schemeClr val="bg1"/>
+                </a:solidFill>
+                <a:effectLst/>
+                <a:latin typeface="Bradley Hand ITC" panose="03070402050302030203" pitchFamily="66" charset="0"/>
+              </a:rPr>
+              <a:t>Your password can’t be too similar to your other personal information.</a:t>
+            </a:r>
+          </a:p>
+          <a:p>
+            <a:pPr>
+              <a:buFont typeface="Arial" panose="020B0604020202020204" pitchFamily="34" charset="0"/>
+              <a:buChar char="•"/>
+            </a:pPr>
+            <a:r>
+              <a:rPr lang="en-US" sz="1800" b="1" i="0" dirty="0">
+                <a:solidFill>
+                  <a:schemeClr val="bg1"/>
+                </a:solidFill>
+                <a:effectLst/>
+                <a:latin typeface="Bradley Hand ITC" panose="03070402050302030203" pitchFamily="66" charset="0"/>
+              </a:rPr>
+              <a:t>Your password must contain at least 8 characters.</a:t>
+            </a:r>
+          </a:p>
+          <a:p>
+            <a:pPr>
+              <a:buFont typeface="Arial" panose="020B0604020202020204" pitchFamily="34" charset="0"/>
+              <a:buChar char="•"/>
+            </a:pPr>
+            <a:r>
+              <a:rPr lang="en-US" sz="1800" b="1" i="0" dirty="0">
+                <a:solidFill>
+                  <a:schemeClr val="bg1"/>
+                </a:solidFill>
+                <a:effectLst/>
+                <a:latin typeface="Bradley Hand ITC" panose="03070402050302030203" pitchFamily="66" charset="0"/>
+              </a:rPr>
+              <a:t>Your password can’t be a commonly used password.</a:t>
+            </a:r>
+          </a:p>
+          <a:p>
+            <a:pPr>
+              <a:buFont typeface="Arial" panose="020B0604020202020204" pitchFamily="34" charset="0"/>
+              <a:buChar char="•"/>
+            </a:pPr>
+            <a:r>
+              <a:rPr lang="en-US" sz="1800" b="1" i="0" dirty="0">
+                <a:solidFill>
+                  <a:schemeClr val="bg1"/>
+                </a:solidFill>
+                <a:effectLst/>
+                <a:latin typeface="Bradley Hand ITC" panose="03070402050302030203" pitchFamily="66" charset="0"/>
+              </a:rPr>
+              <a:t>Your password can’t be entirely numeric.</a:t>
+            </a:r>
+          </a:p>
+          <a:p>
+            <a:pPr>
+              <a:buFont typeface="Arial" panose="020B0604020202020204" pitchFamily="34" charset="0"/>
+              <a:buChar char="•"/>
+            </a:pPr>
+            <a:endParaRPr lang="en-US" sz="1800" b="1" dirty="0">
+              <a:solidFill>
+                <a:schemeClr val="bg1"/>
+              </a:solidFill>
+              <a:latin typeface="Bradley Hand ITC" panose="03070402050302030203" pitchFamily="66" charset="0"/>
+            </a:endParaRPr>
+          </a:p>
+          <a:p>
+            <a:pPr marL="0" indent="0">
+              <a:buNone/>
+            </a:pPr>
+            <a:endParaRPr lang="en-US" sz="1800" b="1" i="0" dirty="0">
+              <a:solidFill>
+                <a:schemeClr val="bg1"/>
+              </a:solidFill>
+              <a:effectLst/>
+              <a:latin typeface="Bradley Hand ITC" panose="03070402050302030203" pitchFamily="66" charset="0"/>
+            </a:endParaRPr>
+          </a:p>
+          <a:p>
+            <a:pPr marL="0" indent="0">
+              <a:buNone/>
+            </a:pPr>
+            <a:r>
+              <a:rPr lang="en-US" sz="1800" b="1" dirty="0">
+                <a:solidFill>
+                  <a:schemeClr val="bg1"/>
+                </a:solidFill>
+                <a:latin typeface="Bradley Hand ITC" panose="03070402050302030203" pitchFamily="66" charset="0"/>
+              </a:rPr>
+              <a:t>                 </a:t>
+            </a:r>
+            <a:r>
+              <a:rPr lang="en-US" sz="1800" b="1" i="0" dirty="0">
+                <a:solidFill>
+                  <a:schemeClr val="bg1"/>
+                </a:solidFill>
+                <a:effectLst/>
+                <a:latin typeface="Bradley Hand ITC" panose="03070402050302030203" pitchFamily="66" charset="0"/>
+              </a:rPr>
+              <a:t>Enter the same password as before, for verification.</a:t>
+            </a:r>
+          </a:p>
+          <a:p>
+            <a:endParaRPr lang="en-IN" sz="1600" b="1" dirty="0">
+              <a:solidFill>
+                <a:schemeClr val="bg1"/>
+              </a:solidFill>
+              <a:latin typeface="Bradley Hand ITC" panose="03070402050302030203" pitchFamily="66" charset="0"/>
+            </a:endParaRPr>
+          </a:p>
+        </p:txBody>
+      </p:sp>
+      <p:sp>
+        <p:nvSpPr>
+          <p:cNvPr id="6" name="Rectangle 5">
+            <a:extLst>
+              <a:ext uri="{FF2B5EF4-FFF2-40B4-BE49-F238E27FC236}">
+                <a16:creationId xmlns:a16="http://schemas.microsoft.com/office/drawing/2014/main" id="{E0E9CAED-A400-CA5F-1710-14979F358165}"/>
+              </a:ext>
+            </a:extLst>
+          </p:cNvPr>
+          <p:cNvSpPr/>
+          <p:nvPr/>
+        </p:nvSpPr>
+        <p:spPr>
+          <a:xfrm>
+            <a:off x="4420998" y="1577130"/>
+            <a:ext cx="3187817" cy="268448"/>
+          </a:xfrm>
+          <a:prstGeom prst="rect">
+            <a:avLst/>
+          </a:prstGeom>
+          <a:solidFill>
+            <a:schemeClr val="bg1"/>
+          </a:solidFill>
+          <a:ln>
+            <a:solidFill>
+              <a:schemeClr val="bg1"/>
+            </a:solidFill>
+          </a:ln>
+        </p:spPr>
+        <p:style>
+          <a:lnRef idx="2">
+            <a:schemeClr val="accent1">
+              <a:shade val="50000"/>
+            </a:schemeClr>
+          </a:lnRef>
+          <a:fillRef idx="1">
+            <a:schemeClr val="accent1"/>
+          </a:fillRef>
+          <a:effectRef idx="0">
+            <a:schemeClr val="accent1"/>
+          </a:effectRef>
+          <a:fontRef idx="minor">
+            <a:schemeClr val="lt1"/>
+          </a:fontRef>
+        </p:style>
+        <p:txBody>
+          <a:bodyPr rtlCol="0" anchor="ctr"/>
+          <a:lstStyle/>
+          <a:p>
+            <a:pPr algn="ctr"/>
+            <a:r>
+              <a:rPr lang="en-IN" dirty="0">
+                <a:ln>
+                  <a:solidFill>
+                    <a:schemeClr val="bg1">
+                      <a:lumMod val="65000"/>
+                    </a:schemeClr>
+                  </a:solidFill>
+                </a:ln>
+                <a:solidFill>
+                  <a:schemeClr val="bg1">
+                    <a:lumMod val="65000"/>
+                  </a:schemeClr>
+                </a:solidFill>
+                <a:latin typeface="Bradley Hand ITC" panose="03070402050302030203" pitchFamily="66" charset="0"/>
+              </a:rPr>
+              <a:t>username</a:t>
+            </a:r>
+          </a:p>
+        </p:txBody>
+      </p:sp>
+      <p:sp>
+        <p:nvSpPr>
+          <p:cNvPr id="7" name="Rectangle 6">
+            <a:extLst>
+              <a:ext uri="{FF2B5EF4-FFF2-40B4-BE49-F238E27FC236}">
+                <a16:creationId xmlns:a16="http://schemas.microsoft.com/office/drawing/2014/main" id="{DE97DE6E-63D3-5255-D497-B44B35412D72}"/>
+              </a:ext>
+            </a:extLst>
+          </p:cNvPr>
+          <p:cNvSpPr/>
+          <p:nvPr/>
+        </p:nvSpPr>
+        <p:spPr>
+          <a:xfrm>
+            <a:off x="4429387" y="2150378"/>
+            <a:ext cx="3187817" cy="268448"/>
+          </a:xfrm>
+          <a:prstGeom prst="rect">
+            <a:avLst/>
+          </a:prstGeom>
+          <a:solidFill>
+            <a:schemeClr val="bg1"/>
+          </a:solidFill>
+          <a:ln>
+            <a:solidFill>
+              <a:schemeClr val="bg1"/>
+            </a:solidFill>
+          </a:ln>
+        </p:spPr>
+        <p:style>
+          <a:lnRef idx="2">
+            <a:schemeClr val="accent1">
+              <a:shade val="50000"/>
+            </a:schemeClr>
+          </a:lnRef>
+          <a:fillRef idx="1">
+            <a:schemeClr val="accent1"/>
+          </a:fillRef>
+          <a:effectRef idx="0">
+            <a:schemeClr val="accent1"/>
+          </a:effectRef>
+          <a:fontRef idx="minor">
+            <a:schemeClr val="lt1"/>
+          </a:fontRef>
+        </p:style>
+        <p:txBody>
+          <a:bodyPr rtlCol="0" anchor="ctr"/>
+          <a:lstStyle/>
+          <a:p>
+            <a:pPr algn="ctr"/>
+            <a:r>
+              <a:rPr lang="en-IN" dirty="0">
+                <a:ln>
+                  <a:solidFill>
+                    <a:schemeClr val="bg1">
+                      <a:lumMod val="65000"/>
+                    </a:schemeClr>
+                  </a:solidFill>
+                </a:ln>
+                <a:solidFill>
+                  <a:schemeClr val="bg1">
+                    <a:lumMod val="65000"/>
+                  </a:schemeClr>
+                </a:solidFill>
+                <a:latin typeface="Bradley Hand ITC" panose="03070402050302030203" pitchFamily="66" charset="0"/>
+              </a:rPr>
+              <a:t>password</a:t>
+            </a:r>
+          </a:p>
+        </p:txBody>
+      </p:sp>
+      <p:sp>
+        <p:nvSpPr>
+          <p:cNvPr id="8" name="Rectangle 7">
+            <a:extLst>
+              <a:ext uri="{FF2B5EF4-FFF2-40B4-BE49-F238E27FC236}">
+                <a16:creationId xmlns:a16="http://schemas.microsoft.com/office/drawing/2014/main" id="{4336FD78-247D-8E28-37E9-249E91B3FE11}"/>
+              </a:ext>
+            </a:extLst>
+          </p:cNvPr>
+          <p:cNvSpPr/>
+          <p:nvPr/>
+        </p:nvSpPr>
+        <p:spPr>
+          <a:xfrm>
+            <a:off x="4502091" y="4390620"/>
+            <a:ext cx="3187817" cy="268448"/>
+          </a:xfrm>
+          <a:prstGeom prst="rect">
+            <a:avLst/>
+          </a:prstGeom>
+          <a:solidFill>
+            <a:schemeClr val="bg1"/>
+          </a:solidFill>
+          <a:ln>
+            <a:solidFill>
+              <a:schemeClr val="bg1"/>
+            </a:solidFill>
+          </a:ln>
+        </p:spPr>
+        <p:style>
+          <a:lnRef idx="2">
+            <a:schemeClr val="accent1">
+              <a:shade val="50000"/>
+            </a:schemeClr>
+          </a:lnRef>
+          <a:fillRef idx="1">
+            <a:schemeClr val="accent1"/>
+          </a:fillRef>
+          <a:effectRef idx="0">
+            <a:schemeClr val="accent1"/>
+          </a:effectRef>
+          <a:fontRef idx="minor">
+            <a:schemeClr val="lt1"/>
+          </a:fontRef>
+        </p:style>
+        <p:txBody>
+          <a:bodyPr rtlCol="0" anchor="ctr"/>
+          <a:lstStyle/>
+          <a:p>
+            <a:pPr algn="ctr"/>
+            <a:r>
+              <a:rPr lang="en-IN" dirty="0">
+                <a:ln>
+                  <a:solidFill>
+                    <a:schemeClr val="bg1">
+                      <a:lumMod val="65000"/>
+                    </a:schemeClr>
+                  </a:solidFill>
+                </a:ln>
+                <a:solidFill>
+                  <a:schemeClr val="bg1">
+                    <a:lumMod val="65000"/>
+                  </a:schemeClr>
+                </a:solidFill>
+                <a:latin typeface="Bradley Hand ITC" panose="03070402050302030203" pitchFamily="66" charset="0"/>
+              </a:rPr>
+              <a:t>Password Confirmation</a:t>
+            </a:r>
+          </a:p>
+        </p:txBody>
+      </p:sp>
+      <p:sp>
+        <p:nvSpPr>
+          <p:cNvPr id="9" name="Rectangle 8">
+            <a:extLst>
+              <a:ext uri="{FF2B5EF4-FFF2-40B4-BE49-F238E27FC236}">
+                <a16:creationId xmlns:a16="http://schemas.microsoft.com/office/drawing/2014/main" id="{B44B787A-F1C4-CBF4-EDC0-B9F289C9BDAC}"/>
+              </a:ext>
+            </a:extLst>
+          </p:cNvPr>
+          <p:cNvSpPr/>
+          <p:nvPr/>
+        </p:nvSpPr>
+        <p:spPr>
+          <a:xfrm>
+            <a:off x="5592659" y="5510244"/>
+            <a:ext cx="1006679" cy="268448"/>
+          </a:xfrm>
+          <a:prstGeom prst="rect">
+            <a:avLst/>
+          </a:prstGeom>
+          <a:ln/>
+        </p:spPr>
+        <p:style>
+          <a:lnRef idx="1">
+            <a:schemeClr val="accent3"/>
+          </a:lnRef>
+          <a:fillRef idx="2">
+            <a:schemeClr val="accent3"/>
+          </a:fillRef>
+          <a:effectRef idx="1">
+            <a:schemeClr val="accent3"/>
+          </a:effectRef>
+          <a:fontRef idx="minor">
+            <a:schemeClr val="dk1"/>
+          </a:fontRef>
+        </p:style>
+        <p:txBody>
+          <a:bodyPr rtlCol="0" anchor="ctr"/>
+          <a:lstStyle/>
+          <a:p>
+            <a:pPr algn="ctr"/>
+            <a:r>
+              <a:rPr lang="en-IN" sz="1400" dirty="0">
+                <a:ln>
+                  <a:solidFill>
+                    <a:schemeClr val="tx1"/>
+                  </a:solidFill>
+                </a:ln>
+                <a:solidFill>
+                  <a:schemeClr val="tx1"/>
+                </a:solidFill>
+                <a:latin typeface="Times New Roman" panose="02020603050405020304" pitchFamily="18" charset="0"/>
+                <a:cs typeface="Times New Roman" panose="02020603050405020304" pitchFamily="18" charset="0"/>
+              </a:rPr>
+              <a:t>Register</a:t>
+            </a:r>
+          </a:p>
+        </p:txBody>
+      </p:sp>
     </p:spTree>
     <p:extLst>
       <p:ext uri="{BB962C8B-B14F-4D97-AF65-F5344CB8AC3E}">
-        <p14:creationId xmlns:p14="http://schemas.microsoft.com/office/powerpoint/2010/main" val="1352817263"/>
+        <p14:creationId xmlns:p14="http://schemas.microsoft.com/office/powerpoint/2010/main" val="3947493107"/>
+      </p:ext>
+    </p:extLst>
+  </p:cSld>
+  <p:clrMapOvr>
+    <a:masterClrMapping/>
+  </p:clrMapOvr>
+</p:sld>
+</file>
+
+<file path=ppt/slides/slide4.xml><?xml version="1.0" encoding="utf-8"?>
+<p:sld xmlns:a="http://schemas.openxmlformats.org/drawingml/2006/main" xmlns:r="http://schemas.openxmlformats.org/officeDocument/2006/relationships" xmlns:p="http://schemas.openxmlformats.org/presentationml/2006/main">
+  <p:cSld>
+    <p:spTree>
+      <p:nvGrpSpPr>
+        <p:cNvPr id="1" name=""/>
+        <p:cNvGrpSpPr/>
+        <p:nvPr/>
+      </p:nvGrpSpPr>
+      <p:grpSpPr>
+        <a:xfrm>
+          <a:off x="0" y="0"/>
+          <a:ext cx="0" cy="0"/>
+          <a:chOff x="0" y="0"/>
+          <a:chExt cx="0" cy="0"/>
+        </a:xfrm>
+      </p:grpSpPr>
+      <p:pic>
+        <p:nvPicPr>
+          <p:cNvPr id="1026" name="Picture 2">
+            <a:extLst>
+              <a:ext uri="{FF2B5EF4-FFF2-40B4-BE49-F238E27FC236}">
+                <a16:creationId xmlns:a16="http://schemas.microsoft.com/office/drawing/2014/main" id="{3DDA38E2-E9DF-54D4-6BEE-A81D0BA37261}"/>
+              </a:ext>
+            </a:extLst>
+          </p:cNvPr>
+          <p:cNvPicPr>
+            <a:picLocks noGrp="1" noChangeAspect="1" noChangeArrowheads="1"/>
+          </p:cNvPicPr>
+          <p:nvPr>
+            <p:ph idx="1"/>
+          </p:nvPr>
+        </p:nvPicPr>
+        <p:blipFill>
+          <a:blip r:embed="rId2">
+            <a:extLst>
+              <a:ext uri="{28A0092B-C50C-407E-A947-70E740481C1C}">
+                <a14:useLocalDpi xmlns:a14="http://schemas.microsoft.com/office/drawing/2010/main" val="0"/>
+              </a:ext>
+            </a:extLst>
+          </a:blip>
+          <a:srcRect/>
+          <a:stretch>
+            <a:fillRect/>
+          </a:stretch>
+        </p:blipFill>
+        <p:spPr bwMode="auto">
+          <a:xfrm>
+            <a:off x="0" y="447"/>
+            <a:ext cx="12192000" cy="6857553"/>
+          </a:xfrm>
+          <a:prstGeom prst="rect">
+            <a:avLst/>
+          </a:prstGeom>
+          <a:noFill/>
+          <a:extLst>
+            <a:ext uri="{909E8E84-426E-40DD-AFC4-6F175D3DCCD1}">
+              <a14:hiddenFill xmlns:a14="http://schemas.microsoft.com/office/drawing/2010/main">
+                <a:solidFill>
+                  <a:srgbClr val="FFFFFF"/>
+                </a:solidFill>
+              </a14:hiddenFill>
+            </a:ext>
+          </a:extLst>
+        </p:spPr>
+      </p:pic>
+      <p:sp>
+        <p:nvSpPr>
+          <p:cNvPr id="4" name="Rectangle 3">
+            <a:extLst>
+              <a:ext uri="{FF2B5EF4-FFF2-40B4-BE49-F238E27FC236}">
+                <a16:creationId xmlns:a16="http://schemas.microsoft.com/office/drawing/2014/main" id="{A6CACB2C-7510-36A4-7C32-864EFE999B9A}"/>
+              </a:ext>
+            </a:extLst>
+          </p:cNvPr>
+          <p:cNvSpPr/>
+          <p:nvPr/>
+        </p:nvSpPr>
+        <p:spPr>
+          <a:xfrm>
+            <a:off x="2430011" y="2434689"/>
+            <a:ext cx="7331978" cy="394282"/>
+          </a:xfrm>
+          <a:prstGeom prst="rect">
+            <a:avLst/>
+          </a:prstGeom>
+          <a:ln>
+            <a:noFill/>
+          </a:ln>
+        </p:spPr>
+        <p:style>
+          <a:lnRef idx="2">
+            <a:schemeClr val="dk1"/>
+          </a:lnRef>
+          <a:fillRef idx="1">
+            <a:schemeClr val="lt1"/>
+          </a:fillRef>
+          <a:effectRef idx="0">
+            <a:schemeClr val="dk1"/>
+          </a:effectRef>
+          <a:fontRef idx="minor">
+            <a:schemeClr val="dk1"/>
+          </a:fontRef>
+        </p:style>
+        <p:txBody>
+          <a:bodyPr rtlCol="0" anchor="ctr"/>
+          <a:lstStyle/>
+          <a:p>
+            <a:pPr algn="ctr"/>
+            <a:r>
+              <a:rPr lang="en-US" b="1" dirty="0">
+                <a:latin typeface="Bradley Hand ITC" panose="03070402050302030203" pitchFamily="66" charset="0"/>
+                <a:cs typeface="Times New Roman" panose="02020603050405020304" pitchFamily="18" charset="0"/>
+              </a:rPr>
+              <a:t>UPLOAD</a:t>
+            </a:r>
+            <a:endParaRPr lang="en-IN" b="1" dirty="0">
+              <a:latin typeface="Bradley Hand ITC" panose="03070402050302030203" pitchFamily="66" charset="0"/>
+              <a:cs typeface="Times New Roman" panose="02020603050405020304" pitchFamily="18" charset="0"/>
+            </a:endParaRPr>
+          </a:p>
+        </p:txBody>
+      </p:sp>
+      <p:sp>
+        <p:nvSpPr>
+          <p:cNvPr id="5" name="Rectangle 4">
+            <a:extLst>
+              <a:ext uri="{FF2B5EF4-FFF2-40B4-BE49-F238E27FC236}">
+                <a16:creationId xmlns:a16="http://schemas.microsoft.com/office/drawing/2014/main" id="{DF39FEAC-3F1A-1470-8E5D-E657E4F90469}"/>
+              </a:ext>
+            </a:extLst>
+          </p:cNvPr>
+          <p:cNvSpPr/>
+          <p:nvPr/>
+        </p:nvSpPr>
+        <p:spPr>
+          <a:xfrm>
+            <a:off x="2430011" y="3103186"/>
+            <a:ext cx="7331978" cy="394282"/>
+          </a:xfrm>
+          <a:prstGeom prst="rect">
+            <a:avLst/>
+          </a:prstGeom>
+          <a:ln>
+            <a:noFill/>
+          </a:ln>
+        </p:spPr>
+        <p:style>
+          <a:lnRef idx="2">
+            <a:schemeClr val="dk1"/>
+          </a:lnRef>
+          <a:fillRef idx="1">
+            <a:schemeClr val="lt1"/>
+          </a:fillRef>
+          <a:effectRef idx="0">
+            <a:schemeClr val="dk1"/>
+          </a:effectRef>
+          <a:fontRef idx="minor">
+            <a:schemeClr val="dk1"/>
+          </a:fontRef>
+        </p:style>
+        <p:txBody>
+          <a:bodyPr rtlCol="0" anchor="ctr"/>
+          <a:lstStyle/>
+          <a:p>
+            <a:pPr algn="ctr"/>
+            <a:r>
+              <a:rPr lang="en-US" b="1" dirty="0">
+                <a:latin typeface="Bradley Hand ITC" panose="03070402050302030203" pitchFamily="66" charset="0"/>
+                <a:cs typeface="Times New Roman" panose="02020603050405020304" pitchFamily="18" charset="0"/>
+              </a:rPr>
+              <a:t>WARDROBE</a:t>
+            </a:r>
+            <a:endParaRPr lang="en-IN" b="1" dirty="0">
+              <a:latin typeface="Bradley Hand ITC" panose="03070402050302030203" pitchFamily="66" charset="0"/>
+              <a:cs typeface="Times New Roman" panose="02020603050405020304" pitchFamily="18" charset="0"/>
+            </a:endParaRPr>
+          </a:p>
+        </p:txBody>
+      </p:sp>
+      <p:sp>
+        <p:nvSpPr>
+          <p:cNvPr id="6" name="Rectangle 5">
+            <a:extLst>
+              <a:ext uri="{FF2B5EF4-FFF2-40B4-BE49-F238E27FC236}">
+                <a16:creationId xmlns:a16="http://schemas.microsoft.com/office/drawing/2014/main" id="{EF240956-B56F-0223-E4FF-2D95AA37E15F}"/>
+              </a:ext>
+            </a:extLst>
+          </p:cNvPr>
+          <p:cNvSpPr/>
+          <p:nvPr/>
+        </p:nvSpPr>
+        <p:spPr>
+          <a:xfrm>
+            <a:off x="2430011" y="3752634"/>
+            <a:ext cx="7331978" cy="394282"/>
+          </a:xfrm>
+          <a:prstGeom prst="rect">
+            <a:avLst/>
+          </a:prstGeom>
+          <a:ln>
+            <a:noFill/>
+          </a:ln>
+        </p:spPr>
+        <p:style>
+          <a:lnRef idx="2">
+            <a:schemeClr val="dk1"/>
+          </a:lnRef>
+          <a:fillRef idx="1">
+            <a:schemeClr val="lt1"/>
+          </a:fillRef>
+          <a:effectRef idx="0">
+            <a:schemeClr val="dk1"/>
+          </a:effectRef>
+          <a:fontRef idx="minor">
+            <a:schemeClr val="dk1"/>
+          </a:fontRef>
+        </p:style>
+        <p:txBody>
+          <a:bodyPr rtlCol="0" anchor="ctr"/>
+          <a:lstStyle/>
+          <a:p>
+            <a:pPr algn="ctr"/>
+            <a:r>
+              <a:rPr lang="en-US" b="1" dirty="0">
+                <a:latin typeface="Bradley Hand ITC" panose="03070402050302030203" pitchFamily="66" charset="0"/>
+                <a:cs typeface="Times New Roman" panose="02020603050405020304" pitchFamily="18" charset="0"/>
+              </a:rPr>
+              <a:t>PROFILE</a:t>
+            </a:r>
+            <a:endParaRPr lang="en-IN" b="1" dirty="0">
+              <a:latin typeface="Bradley Hand ITC" panose="03070402050302030203" pitchFamily="66" charset="0"/>
+              <a:cs typeface="Times New Roman" panose="02020603050405020304" pitchFamily="18" charset="0"/>
+            </a:endParaRPr>
+          </a:p>
+        </p:txBody>
+      </p:sp>
+      <p:sp>
+        <p:nvSpPr>
+          <p:cNvPr id="7" name="Rectangle 6">
+            <a:extLst>
+              <a:ext uri="{FF2B5EF4-FFF2-40B4-BE49-F238E27FC236}">
+                <a16:creationId xmlns:a16="http://schemas.microsoft.com/office/drawing/2014/main" id="{F5B470BF-F6F6-9E91-AC1A-A9B3621E314A}"/>
+              </a:ext>
+            </a:extLst>
+          </p:cNvPr>
+          <p:cNvSpPr/>
+          <p:nvPr/>
+        </p:nvSpPr>
+        <p:spPr>
+          <a:xfrm>
+            <a:off x="2430011" y="4430473"/>
+            <a:ext cx="7331978" cy="394282"/>
+          </a:xfrm>
+          <a:prstGeom prst="rect">
+            <a:avLst/>
+          </a:prstGeom>
+          <a:ln>
+            <a:noFill/>
+          </a:ln>
+        </p:spPr>
+        <p:style>
+          <a:lnRef idx="2">
+            <a:schemeClr val="dk1"/>
+          </a:lnRef>
+          <a:fillRef idx="1">
+            <a:schemeClr val="lt1"/>
+          </a:fillRef>
+          <a:effectRef idx="0">
+            <a:schemeClr val="dk1"/>
+          </a:effectRef>
+          <a:fontRef idx="minor">
+            <a:schemeClr val="dk1"/>
+          </a:fontRef>
+        </p:style>
+        <p:txBody>
+          <a:bodyPr rtlCol="0" anchor="ctr"/>
+          <a:lstStyle/>
+          <a:p>
+            <a:pPr algn="ctr"/>
+            <a:r>
+              <a:rPr lang="en-US" b="1" dirty="0">
+                <a:latin typeface="Bradley Hand ITC" panose="03070402050302030203" pitchFamily="66" charset="0"/>
+                <a:cs typeface="Times New Roman" panose="02020603050405020304" pitchFamily="18" charset="0"/>
+              </a:rPr>
+              <a:t>SETTINGS</a:t>
+            </a:r>
+            <a:endParaRPr lang="en-IN" b="1" dirty="0">
+              <a:latin typeface="Bradley Hand ITC" panose="03070402050302030203" pitchFamily="66" charset="0"/>
+              <a:cs typeface="Times New Roman" panose="02020603050405020304" pitchFamily="18" charset="0"/>
+            </a:endParaRPr>
+          </a:p>
+        </p:txBody>
+      </p:sp>
+      <p:sp>
+        <p:nvSpPr>
+          <p:cNvPr id="8" name="TextBox 7">
+            <a:extLst>
+              <a:ext uri="{FF2B5EF4-FFF2-40B4-BE49-F238E27FC236}">
+                <a16:creationId xmlns:a16="http://schemas.microsoft.com/office/drawing/2014/main" id="{4EB66EE0-EC20-D92A-856F-A9F63E085CA3}"/>
+              </a:ext>
+            </a:extLst>
+          </p:cNvPr>
+          <p:cNvSpPr txBox="1"/>
+          <p:nvPr/>
+        </p:nvSpPr>
+        <p:spPr>
+          <a:xfrm>
+            <a:off x="894825" y="5375221"/>
+            <a:ext cx="1535186" cy="1200329"/>
+          </a:xfrm>
+          <a:prstGeom prst="rect">
+            <a:avLst/>
+          </a:prstGeom>
+          <a:noFill/>
+        </p:spPr>
+        <p:txBody>
+          <a:bodyPr wrap="square" rtlCol="0">
+            <a:spAutoFit/>
+          </a:bodyPr>
+          <a:lstStyle/>
+          <a:p>
+            <a:r>
+              <a:rPr lang="en-US" b="1" dirty="0">
+                <a:solidFill>
+                  <a:schemeClr val="bg1"/>
+                </a:solidFill>
+                <a:latin typeface="Bradley Hand ITC" panose="03070402050302030203" pitchFamily="66" charset="0"/>
+              </a:rPr>
+              <a:t>#Twitter</a:t>
+            </a:r>
+          </a:p>
+          <a:p>
+            <a:r>
+              <a:rPr lang="en-US" b="1" dirty="0">
+                <a:solidFill>
+                  <a:schemeClr val="bg1"/>
+                </a:solidFill>
+                <a:latin typeface="Bradley Hand ITC" panose="03070402050302030203" pitchFamily="66" charset="0"/>
+              </a:rPr>
+              <a:t>#Instagram </a:t>
+            </a:r>
+          </a:p>
+          <a:p>
+            <a:r>
+              <a:rPr lang="en-US" b="1" dirty="0">
+                <a:solidFill>
+                  <a:schemeClr val="bg1"/>
+                </a:solidFill>
+                <a:latin typeface="Bradley Hand ITC" panose="03070402050302030203" pitchFamily="66" charset="0"/>
+              </a:rPr>
+              <a:t>#Snapchat</a:t>
+            </a:r>
+          </a:p>
+          <a:p>
+            <a:r>
+              <a:rPr lang="en-US" b="1" dirty="0">
+                <a:solidFill>
+                  <a:schemeClr val="bg1"/>
+                </a:solidFill>
+                <a:latin typeface="Bradley Hand ITC" panose="03070402050302030203" pitchFamily="66" charset="0"/>
+              </a:rPr>
+              <a:t>#mail-ID</a:t>
+            </a:r>
+          </a:p>
+        </p:txBody>
+      </p:sp>
+      <p:sp>
+        <p:nvSpPr>
+          <p:cNvPr id="9" name="Rectangle 8">
+            <a:extLst>
+              <a:ext uri="{FF2B5EF4-FFF2-40B4-BE49-F238E27FC236}">
+                <a16:creationId xmlns:a16="http://schemas.microsoft.com/office/drawing/2014/main" id="{816A194B-AFFA-2CDC-EF4A-46DBE9AA59E6}"/>
+              </a:ext>
+            </a:extLst>
+          </p:cNvPr>
+          <p:cNvSpPr/>
+          <p:nvPr/>
+        </p:nvSpPr>
+        <p:spPr>
+          <a:xfrm>
+            <a:off x="2430011" y="1761629"/>
+            <a:ext cx="7331978" cy="394282"/>
+          </a:xfrm>
+          <a:prstGeom prst="rect">
+            <a:avLst/>
+          </a:prstGeom>
+          <a:ln>
+            <a:noFill/>
+          </a:ln>
+        </p:spPr>
+        <p:style>
+          <a:lnRef idx="2">
+            <a:schemeClr val="dk1"/>
+          </a:lnRef>
+          <a:fillRef idx="1">
+            <a:schemeClr val="lt1"/>
+          </a:fillRef>
+          <a:effectRef idx="0">
+            <a:schemeClr val="dk1"/>
+          </a:effectRef>
+          <a:fontRef idx="minor">
+            <a:schemeClr val="dk1"/>
+          </a:fontRef>
+        </p:style>
+        <p:txBody>
+          <a:bodyPr rtlCol="0" anchor="ctr"/>
+          <a:lstStyle/>
+          <a:p>
+            <a:pPr algn="ctr"/>
+            <a:r>
+              <a:rPr lang="en-US" b="1" dirty="0">
+                <a:latin typeface="Bradley Hand ITC" panose="03070402050302030203" pitchFamily="66" charset="0"/>
+                <a:cs typeface="Times New Roman" panose="02020603050405020304" pitchFamily="18" charset="0"/>
+              </a:rPr>
+              <a:t>LATEST TRENDS</a:t>
+            </a:r>
+          </a:p>
+        </p:txBody>
+      </p:sp>
+    </p:spTree>
+    <p:extLst>
+      <p:ext uri="{BB962C8B-B14F-4D97-AF65-F5344CB8AC3E}">
+        <p14:creationId xmlns:p14="http://schemas.microsoft.com/office/powerpoint/2010/main" val="132505625"/>
+      </p:ext>
+    </p:extLst>
+  </p:cSld>
+  <p:clrMapOvr>
+    <a:masterClrMapping/>
+  </p:clrMapOvr>
+</p:sld>
+</file>
+
+<file path=ppt/slides/slide5.xml><?xml version="1.0" encoding="utf-8"?>
+<p:sld xmlns:a="http://schemas.openxmlformats.org/drawingml/2006/main" xmlns:r="http://schemas.openxmlformats.org/officeDocument/2006/relationships" xmlns:p="http://schemas.openxmlformats.org/presentationml/2006/main">
+  <p:cSld>
+    <p:spTree>
+      <p:nvGrpSpPr>
+        <p:cNvPr id="1" name=""/>
+        <p:cNvGrpSpPr/>
+        <p:nvPr/>
+      </p:nvGrpSpPr>
+      <p:grpSpPr>
+        <a:xfrm>
+          <a:off x="0" y="0"/>
+          <a:ext cx="0" cy="0"/>
+          <a:chOff x="0" y="0"/>
+          <a:chExt cx="0" cy="0"/>
+        </a:xfrm>
+      </p:grpSpPr>
+      <p:pic>
+        <p:nvPicPr>
+          <p:cNvPr id="4" name="Picture 2">
+            <a:extLst>
+              <a:ext uri="{FF2B5EF4-FFF2-40B4-BE49-F238E27FC236}">
+                <a16:creationId xmlns:a16="http://schemas.microsoft.com/office/drawing/2014/main" id="{8080C570-D68B-FBB6-A621-4707CEA3ADF0}"/>
+              </a:ext>
+            </a:extLst>
+          </p:cNvPr>
+          <p:cNvPicPr>
+            <a:picLocks noChangeAspect="1" noChangeArrowheads="1"/>
+          </p:cNvPicPr>
+          <p:nvPr/>
+        </p:nvPicPr>
+        <p:blipFill>
+          <a:blip r:embed="rId2">
+            <a:extLst>
+              <a:ext uri="{28A0092B-C50C-407E-A947-70E740481C1C}">
+                <a14:useLocalDpi xmlns:a14="http://schemas.microsoft.com/office/drawing/2010/main" val="0"/>
+              </a:ext>
+            </a:extLst>
+          </a:blip>
+          <a:srcRect/>
+          <a:stretch>
+            <a:fillRect/>
+          </a:stretch>
+        </p:blipFill>
+        <p:spPr bwMode="auto">
+          <a:xfrm>
+            <a:off x="0" y="447"/>
+            <a:ext cx="12192000" cy="6857553"/>
+          </a:xfrm>
+          <a:prstGeom prst="rect">
+            <a:avLst/>
+          </a:prstGeom>
+          <a:noFill/>
+          <a:extLst>
+            <a:ext uri="{909E8E84-426E-40DD-AFC4-6F175D3DCCD1}">
+              <a14:hiddenFill xmlns:a14="http://schemas.microsoft.com/office/drawing/2010/main">
+                <a:solidFill>
+                  <a:srgbClr val="FFFFFF"/>
+                </a:solidFill>
+              </a14:hiddenFill>
+            </a:ext>
+          </a:extLst>
+        </p:spPr>
+      </p:pic>
+      <p:sp>
+        <p:nvSpPr>
+          <p:cNvPr id="2" name="Title 1">
+            <a:extLst>
+              <a:ext uri="{FF2B5EF4-FFF2-40B4-BE49-F238E27FC236}">
+                <a16:creationId xmlns:a16="http://schemas.microsoft.com/office/drawing/2014/main" id="{3CDAA9C2-3C6F-8298-EB99-6265F705078E}"/>
+              </a:ext>
+            </a:extLst>
+          </p:cNvPr>
+          <p:cNvSpPr>
+            <a:spLocks noGrp="1"/>
+          </p:cNvSpPr>
+          <p:nvPr>
+            <p:ph type="title"/>
+          </p:nvPr>
+        </p:nvSpPr>
+        <p:spPr/>
+        <p:txBody>
+          <a:bodyPr>
+            <a:normAutofit/>
+          </a:bodyPr>
+          <a:lstStyle/>
+          <a:p>
+            <a:pPr algn="ctr"/>
+            <a:r>
+              <a:rPr lang="en-IN" sz="2400" dirty="0">
+                <a:ln>
+                  <a:solidFill>
+                    <a:schemeClr val="bg1"/>
+                  </a:solidFill>
+                </a:ln>
+                <a:solidFill>
+                  <a:schemeClr val="bg1"/>
+                </a:solidFill>
+                <a:latin typeface="Bradley Hand ITC" panose="03070402050302030203" pitchFamily="66" charset="0"/>
+              </a:rPr>
+              <a:t>LOGOUT</a:t>
+            </a:r>
+          </a:p>
+        </p:txBody>
+      </p:sp>
+      <p:sp>
+        <p:nvSpPr>
+          <p:cNvPr id="3" name="Content Placeholder 2">
+            <a:extLst>
+              <a:ext uri="{FF2B5EF4-FFF2-40B4-BE49-F238E27FC236}">
+                <a16:creationId xmlns:a16="http://schemas.microsoft.com/office/drawing/2014/main" id="{A9B8EAD4-A170-2AE2-44F6-6D44EE85114E}"/>
+              </a:ext>
+            </a:extLst>
+          </p:cNvPr>
+          <p:cNvSpPr>
+            <a:spLocks noGrp="1"/>
+          </p:cNvSpPr>
+          <p:nvPr>
+            <p:ph idx="1"/>
+          </p:nvPr>
+        </p:nvSpPr>
+        <p:spPr>
+          <a:xfrm>
+            <a:off x="838200" y="1607511"/>
+            <a:ext cx="10515600" cy="4351338"/>
+          </a:xfrm>
+        </p:spPr>
+        <p:txBody>
+          <a:bodyPr>
+            <a:normAutofit/>
+          </a:bodyPr>
+          <a:lstStyle/>
+          <a:p>
+            <a:pPr marL="0" indent="0" algn="ctr">
+              <a:buNone/>
+            </a:pPr>
+            <a:r>
+              <a:rPr lang="en-US" sz="1800" b="1" i="0" dirty="0">
+                <a:solidFill>
+                  <a:schemeClr val="bg1"/>
+                </a:solidFill>
+                <a:effectLst/>
+                <a:latin typeface="Bradley Hand ITC" panose="03070402050302030203" pitchFamily="66" charset="0"/>
+              </a:rPr>
+              <a:t>Are you sure you want to log out?</a:t>
+            </a:r>
+            <a:endParaRPr lang="en-IN" sz="1800" b="1" dirty="0">
+              <a:solidFill>
+                <a:schemeClr val="bg1"/>
+              </a:solidFill>
+              <a:latin typeface="Bradley Hand ITC" panose="03070402050302030203" pitchFamily="66" charset="0"/>
+            </a:endParaRPr>
+          </a:p>
+        </p:txBody>
+      </p:sp>
+      <p:sp>
+        <p:nvSpPr>
+          <p:cNvPr id="6" name="Rectangle 5">
+            <a:extLst>
+              <a:ext uri="{FF2B5EF4-FFF2-40B4-BE49-F238E27FC236}">
+                <a16:creationId xmlns:a16="http://schemas.microsoft.com/office/drawing/2014/main" id="{02ECCA8A-8966-E9B5-2A11-2F5854BC738E}"/>
+              </a:ext>
+            </a:extLst>
+          </p:cNvPr>
+          <p:cNvSpPr/>
+          <p:nvPr/>
+        </p:nvSpPr>
+        <p:spPr>
+          <a:xfrm>
+            <a:off x="5301842" y="2306972"/>
+            <a:ext cx="1427527" cy="327171"/>
+          </a:xfrm>
+          <a:prstGeom prst="rect">
+            <a:avLst/>
+          </a:prstGeom>
+          <a:solidFill>
+            <a:schemeClr val="bg1"/>
+          </a:solidFill>
+          <a:ln>
+            <a:solidFill>
+              <a:schemeClr val="bg1"/>
+            </a:solidFill>
+          </a:ln>
+        </p:spPr>
+        <p:style>
+          <a:lnRef idx="2">
+            <a:schemeClr val="accent1">
+              <a:shade val="50000"/>
+            </a:schemeClr>
+          </a:lnRef>
+          <a:fillRef idx="1">
+            <a:schemeClr val="accent1"/>
+          </a:fillRef>
+          <a:effectRef idx="0">
+            <a:schemeClr val="accent1"/>
+          </a:effectRef>
+          <a:fontRef idx="minor">
+            <a:schemeClr val="lt1"/>
+          </a:fontRef>
+        </p:style>
+        <p:txBody>
+          <a:bodyPr rtlCol="0" anchor="ctr"/>
+          <a:lstStyle/>
+          <a:p>
+            <a:pPr algn="ctr"/>
+            <a:r>
+              <a:rPr lang="en-IN" sz="1400" dirty="0">
+                <a:ln>
+                  <a:solidFill>
+                    <a:schemeClr val="tx1"/>
+                  </a:solidFill>
+                </a:ln>
+                <a:solidFill>
+                  <a:schemeClr val="tx1"/>
+                </a:solidFill>
+                <a:latin typeface="Times New Roman" panose="02020603050405020304" pitchFamily="18" charset="0"/>
+                <a:cs typeface="Times New Roman" panose="02020603050405020304" pitchFamily="18" charset="0"/>
+              </a:rPr>
+              <a:t>Yes, Logout</a:t>
+            </a:r>
+          </a:p>
+        </p:txBody>
+      </p:sp>
+    </p:spTree>
+    <p:extLst>
+      <p:ext uri="{BB962C8B-B14F-4D97-AF65-F5344CB8AC3E}">
+        <p14:creationId xmlns:p14="http://schemas.microsoft.com/office/powerpoint/2010/main" val="2413901708"/>
+      </p:ext>
+    </p:extLst>
+  </p:cSld>
+  <p:clrMapOvr>
+    <a:masterClrMapping/>
+  </p:clrMapOvr>
+</p:sld>
+</file>
+
+<file path=ppt/slides/slide6.xml><?xml version="1.0" encoding="utf-8"?>
+<p:sld xmlns:a="http://schemas.openxmlformats.org/drawingml/2006/main" xmlns:r="http://schemas.openxmlformats.org/officeDocument/2006/relationships" xmlns:p="http://schemas.openxmlformats.org/presentationml/2006/main">
+  <p:cSld>
+    <p:spTree>
+      <p:nvGrpSpPr>
+        <p:cNvPr id="1" name=""/>
+        <p:cNvGrpSpPr/>
+        <p:nvPr/>
+      </p:nvGrpSpPr>
+      <p:grpSpPr>
+        <a:xfrm>
+          <a:off x="0" y="0"/>
+          <a:ext cx="0" cy="0"/>
+          <a:chOff x="0" y="0"/>
+          <a:chExt cx="0" cy="0"/>
+        </a:xfrm>
+      </p:grpSpPr>
+      <p:pic>
+        <p:nvPicPr>
+          <p:cNvPr id="4" name="Picture 2">
+            <a:extLst>
+              <a:ext uri="{FF2B5EF4-FFF2-40B4-BE49-F238E27FC236}">
+                <a16:creationId xmlns:a16="http://schemas.microsoft.com/office/drawing/2014/main" id="{0462A02D-F92C-0CCD-EE28-3A8511665C82}"/>
+              </a:ext>
+            </a:extLst>
+          </p:cNvPr>
+          <p:cNvPicPr>
+            <a:picLocks noChangeAspect="1" noChangeArrowheads="1"/>
+          </p:cNvPicPr>
+          <p:nvPr/>
+        </p:nvPicPr>
+        <p:blipFill>
+          <a:blip r:embed="rId2">
+            <a:extLst>
+              <a:ext uri="{28A0092B-C50C-407E-A947-70E740481C1C}">
+                <a14:useLocalDpi xmlns:a14="http://schemas.microsoft.com/office/drawing/2010/main" val="0"/>
+              </a:ext>
+            </a:extLst>
+          </a:blip>
+          <a:srcRect/>
+          <a:stretch>
+            <a:fillRect/>
+          </a:stretch>
+        </p:blipFill>
+        <p:spPr bwMode="auto">
+          <a:xfrm>
+            <a:off x="0" y="447"/>
+            <a:ext cx="12192000" cy="6857553"/>
+          </a:xfrm>
+          <a:prstGeom prst="rect">
+            <a:avLst/>
+          </a:prstGeom>
+          <a:noFill/>
+          <a:extLst>
+            <a:ext uri="{909E8E84-426E-40DD-AFC4-6F175D3DCCD1}">
+              <a14:hiddenFill xmlns:a14="http://schemas.microsoft.com/office/drawing/2010/main">
+                <a:solidFill>
+                  <a:srgbClr val="FFFFFF"/>
+                </a:solidFill>
+              </a14:hiddenFill>
+            </a:ext>
+          </a:extLst>
+        </p:spPr>
+      </p:pic>
+      <p:sp>
+        <p:nvSpPr>
+          <p:cNvPr id="2" name="Title 1">
+            <a:extLst>
+              <a:ext uri="{FF2B5EF4-FFF2-40B4-BE49-F238E27FC236}">
+                <a16:creationId xmlns:a16="http://schemas.microsoft.com/office/drawing/2014/main" id="{E46D1CBF-BE1E-8782-C87E-E87BA5FC94B9}"/>
+              </a:ext>
+            </a:extLst>
+          </p:cNvPr>
+          <p:cNvSpPr>
+            <a:spLocks noGrp="1"/>
+          </p:cNvSpPr>
+          <p:nvPr>
+            <p:ph type="title"/>
+          </p:nvPr>
+        </p:nvSpPr>
+        <p:spPr/>
+        <p:txBody>
+          <a:bodyPr/>
+          <a:lstStyle/>
+          <a:p>
+            <a:endParaRPr lang="en-IN"/>
+          </a:p>
+        </p:txBody>
+      </p:sp>
+      <p:sp>
+        <p:nvSpPr>
+          <p:cNvPr id="3" name="Content Placeholder 2">
+            <a:extLst>
+              <a:ext uri="{FF2B5EF4-FFF2-40B4-BE49-F238E27FC236}">
+                <a16:creationId xmlns:a16="http://schemas.microsoft.com/office/drawing/2014/main" id="{437A56C7-1810-3E7A-E9B3-EEB0C9238516}"/>
+              </a:ext>
+            </a:extLst>
+          </p:cNvPr>
+          <p:cNvSpPr>
+            <a:spLocks noGrp="1"/>
+          </p:cNvSpPr>
+          <p:nvPr>
+            <p:ph idx="1"/>
+          </p:nvPr>
+        </p:nvSpPr>
+        <p:spPr/>
+        <p:txBody>
+          <a:bodyPr/>
+          <a:lstStyle/>
+          <a:p>
+            <a:endParaRPr lang="en-IN"/>
+          </a:p>
+        </p:txBody>
+      </p:sp>
+    </p:spTree>
+    <p:extLst>
+      <p:ext uri="{BB962C8B-B14F-4D97-AF65-F5344CB8AC3E}">
+        <p14:creationId xmlns:p14="http://schemas.microsoft.com/office/powerpoint/2010/main" val="4243997776"/>
       </p:ext>
     </p:extLst>
   </p:cSld>

</xml_diff>